<commit_message>
Updated stuff before logo
</commit_message>
<xml_diff>
--- a/How to use.pptx
+++ b/How to use.pptx
@@ -24756,8 +24756,11 @@
             </a:pPr>
             <a:r>
               <a:rPr lang="en-US" dirty="0"/>
-              <a:t>Title for those who contribute over ₹100</a:t>
+              <a:t>Title for those who donate ₹100 amount towards the development of the app.</a:t>
             </a:r>
+          </a:p>
+          <a:p>
+            <a:endParaRPr lang="en-US" dirty="0"/>
           </a:p>
         </p:txBody>
       </p:sp>
@@ -24857,7 +24860,7 @@
             </a:pPr>
             <a:r>
               <a:rPr lang="en-US" dirty="0"/>
-              <a:t>Title for those who donate any amount towards the development of the app.</a:t>
+              <a:t>Title for those who donate ₹20 amount towards the development of the app.</a:t>
             </a:r>
           </a:p>
           <a:p>
@@ -24945,8 +24948,8 @@
               <a:buNone/>
             </a:pPr>
             <a:r>
-              <a:rPr lang="en-US" dirty="0"/>
-              <a:t>Title for those who contribute over ₹200</a:t>
+              <a:rPr lang="en-US"/>
+              <a:t>Title for those who donate ₹500 amount towards the development of the app.</a:t>
             </a:r>
           </a:p>
         </p:txBody>
@@ -25713,6 +25716,15 @@
 </file>
 
 <file path=customXml/item1.xml><?xml version="1.0" encoding="utf-8"?>
+<?mso-contentType ?>
+<FormTemplates xmlns="http://schemas.microsoft.com/sharepoint/v3/contenttype/forms">
+  <Display>DocumentLibraryForm</Display>
+  <Edit>DocumentLibraryForm</Edit>
+  <New>DocumentLibraryForm</New>
+</FormTemplates>
+</file>
+
+<file path=customXml/item2.xml><?xml version="1.0" encoding="utf-8"?>
 <p:properties xmlns:p="http://schemas.microsoft.com/office/2006/metadata/properties" xmlns:xsi="http://www.w3.org/2001/XMLSchema-instance" xmlns:pc="http://schemas.microsoft.com/office/infopath/2007/PartnerControls">
   <documentManagement>
     <_ip_UnifiedCompliancePolicyUIAction xmlns="http://schemas.microsoft.com/sharepoint/v3" xsi:nil="true"/>
@@ -25730,15 +25742,6 @@
     <MediaServiceKeyPoints xmlns="71af3243-3dd4-4a8d-8c0d-dd76da1f02a5" xsi:nil="true"/>
   </documentManagement>
 </p:properties>
-</file>
-
-<file path=customXml/item2.xml><?xml version="1.0" encoding="utf-8"?>
-<?mso-contentType ?>
-<FormTemplates xmlns="http://schemas.microsoft.com/sharepoint/v3/contenttype/forms">
-  <Display>DocumentLibraryForm</Display>
-  <Edit>DocumentLibraryForm</Edit>
-  <New>DocumentLibraryForm</New>
-</FormTemplates>
 </file>
 
 <file path=customXml/item3.xml><?xml version="1.0" encoding="utf-8"?>
@@ -26048,6 +26051,14 @@
 </file>
 
 <file path=customXml/itemProps1.xml><?xml version="1.0" encoding="utf-8"?>
+<ds:datastoreItem xmlns:ds="http://schemas.openxmlformats.org/officeDocument/2006/customXml" ds:itemID="{A1D2ED2F-BDEE-47B8-82AA-B088E838B0E6}">
+  <ds:schemaRefs>
+    <ds:schemaRef ds:uri="http://schemas.microsoft.com/sharepoint/v3/contenttype/forms"/>
+  </ds:schemaRefs>
+</ds:datastoreItem>
+</file>
+
+<file path=customXml/itemProps2.xml><?xml version="1.0" encoding="utf-8"?>
 <ds:datastoreItem xmlns:ds="http://schemas.openxmlformats.org/officeDocument/2006/customXml" ds:itemID="{FD7EB4D8-2DC8-4900-B296-3F8E8CD9E6AE}">
   <ds:schemaRefs>
     <ds:schemaRef ds:uri="http://schemas.microsoft.com/office/2006/metadata/properties"/>
@@ -26055,14 +26066,6 @@
     <ds:schemaRef ds:uri="http://schemas.microsoft.com/sharepoint/v3"/>
     <ds:schemaRef ds:uri="71af3243-3dd4-4a8d-8c0d-dd76da1f02a5"/>
     <ds:schemaRef ds:uri="230e9df3-be65-4c73-a93b-d1236ebd677e"/>
-  </ds:schemaRefs>
-</ds:datastoreItem>
-</file>
-
-<file path=customXml/itemProps2.xml><?xml version="1.0" encoding="utf-8"?>
-<ds:datastoreItem xmlns:ds="http://schemas.openxmlformats.org/officeDocument/2006/customXml" ds:itemID="{A1D2ED2F-BDEE-47B8-82AA-B088E838B0E6}">
-  <ds:schemaRefs>
-    <ds:schemaRef ds:uri="http://schemas.microsoft.com/sharepoint/v3/contenttype/forms"/>
   </ds:schemaRefs>
 </ds:datastoreItem>
 </file>

</xml_diff>